<commit_message>
presentation: updates & material
</commit_message>
<xml_diff>
--- a/presentazione/presentazione.pptx
+++ b/presentazione/presentazione.pptx
@@ -12,7 +12,7 @@
     <p:sldId id="257" r:id="rId3"/>
     <p:sldId id="267" r:id="rId4"/>
     <p:sldId id="268" r:id="rId5"/>
-    <p:sldId id="259" r:id="rId6"/>
+    <p:sldId id="276" r:id="rId6"/>
     <p:sldId id="260" r:id="rId7"/>
     <p:sldId id="270" r:id="rId8"/>
     <p:sldId id="269" r:id="rId9"/>
@@ -1280,7 +1280,32 @@
           <a:bodyPr/>
           <a:lstStyle/>
           <a:p>
-            <a:endParaRPr lang="en-GB" dirty="0"/>
+            <a:r>
+              <a:rPr lang="en-GB" dirty="0"/>
+              <a:t>About GPROF output and I/O</a:t>
+            </a:r>
+          </a:p>
+          <a:p>
+            <a:r>
+              <a:rPr lang="en-GB" dirty="0"/>
+              <a:t>https://</a:t>
+            </a:r>
+            <a:r>
+              <a:rPr lang="en-GB" dirty="0" err="1"/>
+              <a:t>stackoverflow.com</a:t>
+            </a:r>
+            <a:r>
+              <a:rPr lang="en-GB" dirty="0"/>
+              <a:t>/questions/485649/confusing-</a:t>
+            </a:r>
+            <a:r>
+              <a:rPr lang="en-GB" dirty="0" err="1"/>
+              <a:t>gprof</a:t>
+            </a:r>
+            <a:r>
+              <a:rPr lang="en-GB" dirty="0"/>
+              <a:t>-output</a:t>
+            </a:r>
           </a:p>
         </p:txBody>
       </p:sp>
@@ -1301,7 +1326,7 @@
           <a:p>
             <a:fld id="{A26EA17D-77D1-8E4E-9F7C-6370CAEEF1CF}" type="slidenum">
               <a:rPr lang="en-GB" smtClean="0"/>
-              <a:t>8</a:t>
+              <a:t>5</a:t>
             </a:fld>
             <a:endParaRPr lang="en-GB"/>
           </a:p>
@@ -1310,7 +1335,7 @@
     </p:spTree>
     <p:extLst>
       <p:ext uri="{BB962C8B-B14F-4D97-AF65-F5344CB8AC3E}">
-        <p14:creationId xmlns:p14="http://schemas.microsoft.com/office/powerpoint/2010/main" val="254739935"/>
+        <p14:creationId xmlns:p14="http://schemas.microsoft.com/office/powerpoint/2010/main" val="3209153554"/>
       </p:ext>
     </p:extLst>
   </p:cSld>
@@ -1385,7 +1410,7 @@
           <a:p>
             <a:fld id="{A26EA17D-77D1-8E4E-9F7C-6370CAEEF1CF}" type="slidenum">
               <a:rPr lang="en-GB" smtClean="0"/>
-              <a:t>9</a:t>
+              <a:t>8</a:t>
             </a:fld>
             <a:endParaRPr lang="en-GB"/>
           </a:p>
@@ -1394,7 +1419,7 @@
     </p:spTree>
     <p:extLst>
       <p:ext uri="{BB962C8B-B14F-4D97-AF65-F5344CB8AC3E}">
-        <p14:creationId xmlns:p14="http://schemas.microsoft.com/office/powerpoint/2010/main" val="3262814792"/>
+        <p14:creationId xmlns:p14="http://schemas.microsoft.com/office/powerpoint/2010/main" val="254739935"/>
       </p:ext>
     </p:extLst>
   </p:cSld>
@@ -1469,7 +1494,7 @@
           <a:p>
             <a:fld id="{A26EA17D-77D1-8E4E-9F7C-6370CAEEF1CF}" type="slidenum">
               <a:rPr lang="en-GB" smtClean="0"/>
-              <a:t>10</a:t>
+              <a:t>9</a:t>
             </a:fld>
             <a:endParaRPr lang="en-GB"/>
           </a:p>
@@ -1478,7 +1503,7 @@
     </p:spTree>
     <p:extLst>
       <p:ext uri="{BB962C8B-B14F-4D97-AF65-F5344CB8AC3E}">
-        <p14:creationId xmlns:p14="http://schemas.microsoft.com/office/powerpoint/2010/main" val="1371943977"/>
+        <p14:creationId xmlns:p14="http://schemas.microsoft.com/office/powerpoint/2010/main" val="3262814792"/>
       </p:ext>
     </p:extLst>
   </p:cSld>
@@ -1553,6 +1578,90 @@
           <a:p>
             <a:fld id="{A26EA17D-77D1-8E4E-9F7C-6370CAEEF1CF}" type="slidenum">
               <a:rPr lang="en-GB" smtClean="0"/>
+              <a:t>10</a:t>
+            </a:fld>
+            <a:endParaRPr lang="en-GB"/>
+          </a:p>
+        </p:txBody>
+      </p:sp>
+    </p:spTree>
+    <p:extLst>
+      <p:ext uri="{BB962C8B-B14F-4D97-AF65-F5344CB8AC3E}">
+        <p14:creationId xmlns:p14="http://schemas.microsoft.com/office/powerpoint/2010/main" val="1371943977"/>
+      </p:ext>
+    </p:extLst>
+  </p:cSld>
+  <p:clrMapOvr>
+    <a:masterClrMapping/>
+  </p:clrMapOvr>
+</p:notes>
+</file>
+
+<file path=ppt/notesSlides/notesSlide7.xml><?xml version="1.0" encoding="utf-8"?>
+<p:notes xmlns:a="http://schemas.openxmlformats.org/drawingml/2006/main" xmlns:r="http://schemas.openxmlformats.org/officeDocument/2006/relationships" xmlns:p="http://schemas.openxmlformats.org/presentationml/2006/main">
+  <p:cSld>
+    <p:spTree>
+      <p:nvGrpSpPr>
+        <p:cNvPr id="1" name=""/>
+        <p:cNvGrpSpPr/>
+        <p:nvPr/>
+      </p:nvGrpSpPr>
+      <p:grpSpPr>
+        <a:xfrm>
+          <a:off x="0" y="0"/>
+          <a:ext cx="0" cy="0"/>
+          <a:chOff x="0" y="0"/>
+          <a:chExt cx="0" cy="0"/>
+        </a:xfrm>
+      </p:grpSpPr>
+      <p:sp>
+        <p:nvSpPr>
+          <p:cNvPr id="2" name="Segnaposto immagine diapositiva 1"/>
+          <p:cNvSpPr>
+            <a:spLocks noGrp="1" noRot="1" noChangeAspect="1"/>
+          </p:cNvSpPr>
+          <p:nvPr>
+            <p:ph type="sldImg"/>
+          </p:nvPr>
+        </p:nvSpPr>
+        <p:spPr/>
+      </p:sp>
+      <p:sp>
+        <p:nvSpPr>
+          <p:cNvPr id="3" name="Segnaposto note 2"/>
+          <p:cNvSpPr>
+            <a:spLocks noGrp="1"/>
+          </p:cNvSpPr>
+          <p:nvPr>
+            <p:ph type="body" idx="1"/>
+          </p:nvPr>
+        </p:nvSpPr>
+        <p:spPr/>
+        <p:txBody>
+          <a:bodyPr/>
+          <a:lstStyle/>
+          <a:p>
+            <a:endParaRPr lang="en-GB" dirty="0"/>
+          </a:p>
+        </p:txBody>
+      </p:sp>
+      <p:sp>
+        <p:nvSpPr>
+          <p:cNvPr id="4" name="Segnaposto numero diapositiva 3"/>
+          <p:cNvSpPr>
+            <a:spLocks noGrp="1"/>
+          </p:cNvSpPr>
+          <p:nvPr>
+            <p:ph type="sldNum" sz="quarter" idx="5"/>
+          </p:nvPr>
+        </p:nvSpPr>
+        <p:spPr/>
+        <p:txBody>
+          <a:bodyPr/>
+          <a:lstStyle/>
+          <a:p>
+            <a:fld id="{A26EA17D-77D1-8E4E-9F7C-6370CAEEF1CF}" type="slidenum">
+              <a:rPr lang="en-GB" smtClean="0"/>
               <a:t>11</a:t>
             </a:fld>
             <a:endParaRPr lang="en-GB"/>
@@ -1572,7 +1681,7 @@
 </p:notes>
 </file>
 
-<file path=ppt/notesSlides/notesSlide7.xml><?xml version="1.0" encoding="utf-8"?>
+<file path=ppt/notesSlides/notesSlide8.xml><?xml version="1.0" encoding="utf-8"?>
 <p:notes xmlns:a="http://schemas.openxmlformats.org/drawingml/2006/main" xmlns:r="http://schemas.openxmlformats.org/officeDocument/2006/relationships" xmlns:p="http://schemas.openxmlformats.org/presentationml/2006/main">
   <p:cSld>
     <p:spTree>
@@ -8241,163 +8350,1012 @@
             <p:ph idx="1"/>
           </p:nvPr>
         </p:nvSpPr>
-        <p:spPr/>
-        <p:txBody>
-          <a:bodyPr/>
-          <a:lstStyle/>
-          <a:p>
-            <a:r>
-              <a:rPr lang="en-US" dirty="0"/>
+        <p:spPr>
+          <a:xfrm>
+            <a:off x="228600" y="2008908"/>
+            <a:ext cx="8569036" cy="4302991"/>
+          </a:xfrm>
+        </p:spPr>
+        <p:txBody>
+          <a:bodyPr>
+            <a:normAutofit/>
+          </a:bodyPr>
+          <a:lstStyle/>
+          <a:p>
+            <a:r>
+              <a:rPr lang="en-US" sz="2000" dirty="0"/>
               <a:t>Profiling </a:t>
             </a:r>
             <a:r>
-              <a:rPr lang="en-US" dirty="0" err="1"/>
+              <a:rPr lang="en-US" sz="2000" dirty="0" err="1"/>
               <a:t>svolto</a:t>
             </a:r>
             <a:r>
-              <a:rPr lang="en-US" dirty="0"/>
+              <a:rPr lang="en-US" sz="2000" dirty="0"/>
               <a:t> con GNU </a:t>
             </a:r>
             <a:r>
-              <a:rPr lang="en-US" dirty="0" err="1"/>
+              <a:rPr lang="en-US" sz="2000" dirty="0" err="1"/>
               <a:t>gprof</a:t>
             </a:r>
             <a:r>
-              <a:rPr lang="en-US" dirty="0"/>
+              <a:rPr lang="en-US" sz="2000" dirty="0"/>
               <a:t>:</a:t>
             </a:r>
             <a:br>
-              <a:rPr lang="en-US" dirty="0"/>
+              <a:rPr lang="en-US" sz="2000" dirty="0"/>
             </a:br>
             <a:r>
-              <a:rPr lang="en-US" dirty="0" err="1"/>
+              <a:rPr lang="en-US" sz="2000" dirty="0" err="1"/>
               <a:t>gcc</a:t>
             </a:r>
             <a:r>
-              <a:rPr lang="en-US" dirty="0"/>
+              <a:rPr lang="en-US" sz="2000" dirty="0"/>
               <a:t> –</a:t>
             </a:r>
             <a:r>
-              <a:rPr lang="en-US" dirty="0" err="1"/>
+              <a:rPr lang="en-US" sz="2000" dirty="0" err="1"/>
               <a:t>pg</a:t>
             </a:r>
             <a:r>
-              <a:rPr lang="en-US" dirty="0"/>
+              <a:rPr lang="en-US" sz="2000" dirty="0"/>
               <a:t> </a:t>
             </a:r>
             <a:r>
-              <a:rPr lang="en-US" dirty="0" err="1"/>
+              <a:rPr lang="en-US" sz="2000" dirty="0" err="1"/>
               <a:t>particles_simulation.c</a:t>
             </a:r>
             <a:r>
-              <a:rPr lang="en-US" dirty="0"/>
+              <a:rPr lang="en-US" sz="2000" dirty="0"/>
               <a:t> -o </a:t>
             </a:r>
             <a:r>
-              <a:rPr lang="en-US" dirty="0" err="1"/>
+              <a:rPr lang="en-US" sz="2000" dirty="0" err="1"/>
               <a:t>particles_simulation.o</a:t>
             </a:r>
             <a:br>
-              <a:rPr lang="en-US" dirty="0"/>
+              <a:rPr lang="en-US" sz="2000" dirty="0"/>
             </a:br>
             <a:r>
-              <a:rPr lang="en-US" dirty="0"/>
-              <a:t>time ./</a:t>
-            </a:r>
-            <a:r>
-              <a:rPr lang="en-US" dirty="0" err="1"/>
+              <a:rPr lang="en-US" sz="2000" dirty="0" err="1"/>
+              <a:t>gprof</a:t>
+            </a:r>
+            <a:r>
+              <a:rPr lang="en-US" sz="2000" dirty="0"/>
+              <a:t> </a:t>
+            </a:r>
+            <a:r>
+              <a:rPr lang="en-US" sz="2000" dirty="0" err="1"/>
               <a:t>particles_simulation.o</a:t>
             </a:r>
-            <a:br>
-              <a:rPr lang="en-US" dirty="0"/>
-            </a:br>
-            <a:r>
-              <a:rPr lang="en-US" dirty="0" err="1"/>
-              <a:t>gprof</a:t>
-            </a:r>
-            <a:r>
-              <a:rPr lang="en-US" dirty="0"/>
+            <a:r>
+              <a:rPr lang="en-US" sz="2000" dirty="0"/>
               <a:t> </a:t>
             </a:r>
             <a:r>
-              <a:rPr lang="en-US" dirty="0" err="1"/>
-              <a:t>particles_simulation.o</a:t>
-            </a:r>
-            <a:r>
-              <a:rPr lang="en-US" dirty="0"/>
-              <a:t> </a:t>
-            </a:r>
-            <a:r>
-              <a:rPr lang="en-US" dirty="0" err="1"/>
+              <a:rPr lang="en-US" sz="2000" dirty="0" err="1"/>
               <a:t>gmon.out</a:t>
             </a:r>
-            <a:endParaRPr lang="en-US" dirty="0"/>
-          </a:p>
-          <a:p>
-            <a:r>
-              <a:rPr lang="en-US" dirty="0" err="1"/>
-              <a:t>Risultati</a:t>
-            </a:r>
-            <a:r>
-              <a:rPr lang="en-US" dirty="0"/>
-              <a:t>:</a:t>
+            <a:endParaRPr lang="en-US" sz="2000" dirty="0"/>
+          </a:p>
+          <a:p>
+            <a:endParaRPr lang="en-US" sz="2400" dirty="0"/>
+          </a:p>
+          <a:p>
+            <a:pPr marL="0" indent="0">
+              <a:buNone/>
+            </a:pPr>
+            <a:r>
+              <a:rPr lang="en-US" sz="2400" dirty="0"/>
+              <a:t>   </a:t>
             </a:r>
           </a:p>
           <a:p>
             <a:pPr marL="457200" lvl="1" indent="0">
               <a:buNone/>
             </a:pPr>
-            <a:r>
-              <a:rPr lang="en-US" dirty="0"/>
-              <a:t>...</a:t>
-            </a:r>
-          </a:p>
-          <a:p>
-            <a:endParaRPr lang="en-US" dirty="0"/>
-          </a:p>
-          <a:p>
-            <a:endParaRPr lang="en-US" dirty="0"/>
-          </a:p>
-          <a:p>
-            <a:r>
-              <a:rPr lang="en-US" dirty="0" err="1"/>
-              <a:t>L’hardware</a:t>
-            </a:r>
-            <a:r>
-              <a:rPr lang="en-US" dirty="0"/>
-              <a:t> </a:t>
-            </a:r>
-            <a:r>
-              <a:rPr lang="en-US" dirty="0" err="1"/>
-              <a:t>utilizzato</a:t>
-            </a:r>
-            <a:r>
-              <a:rPr lang="en-US" dirty="0"/>
-              <a:t> per </a:t>
-            </a:r>
-            <a:r>
-              <a:rPr lang="en-US" dirty="0" err="1"/>
-              <a:t>i</a:t>
-            </a:r>
-            <a:r>
-              <a:rPr lang="en-US" dirty="0"/>
-              <a:t> test </a:t>
-            </a:r>
-            <a:r>
-              <a:rPr lang="en-US" dirty="0" err="1"/>
-              <a:t>è</a:t>
-            </a:r>
-            <a:r>
-              <a:rPr lang="en-US" dirty="0"/>
-              <a:t> ....</a:t>
-            </a:r>
-          </a:p>
-        </p:txBody>
-      </p:sp>
+            <a:endParaRPr lang="en-US" sz="2000" dirty="0"/>
+          </a:p>
+        </p:txBody>
+      </p:sp>
+      <p:sp>
+        <p:nvSpPr>
+          <p:cNvPr id="4" name="Rettangolo con angoli arrotondati 3">
+            <a:extLst>
+              <a:ext uri="{FF2B5EF4-FFF2-40B4-BE49-F238E27FC236}">
+                <a16:creationId xmlns:a16="http://schemas.microsoft.com/office/drawing/2014/main" id="{6C74F786-3AF7-D24B-8192-4697AE48A6F6}"/>
+              </a:ext>
+            </a:extLst>
+          </p:cNvPr>
+          <p:cNvSpPr/>
+          <p:nvPr/>
+        </p:nvSpPr>
+        <p:spPr>
+          <a:xfrm>
+            <a:off x="8712437" y="2957411"/>
+            <a:ext cx="3117272" cy="568037"/>
+          </a:xfrm>
+          <a:prstGeom prst="roundRect">
+            <a:avLst/>
+          </a:prstGeom>
+        </p:spPr>
+        <p:style>
+          <a:lnRef idx="1">
+            <a:schemeClr val="accent4"/>
+          </a:lnRef>
+          <a:fillRef idx="2">
+            <a:schemeClr val="accent4"/>
+          </a:fillRef>
+          <a:effectRef idx="1">
+            <a:schemeClr val="accent4"/>
+          </a:effectRef>
+          <a:fontRef idx="minor">
+            <a:schemeClr val="dk1"/>
+          </a:fontRef>
+        </p:style>
+        <p:txBody>
+          <a:bodyPr rtlCol="0" anchor="ctr"/>
+          <a:lstStyle/>
+          <a:p>
+            <a:pPr algn="ctr"/>
+            <a:r>
+              <a:rPr lang="en-GB" dirty="0"/>
+              <a:t>HARDWARE USED </a:t>
+            </a:r>
+          </a:p>
+        </p:txBody>
+      </p:sp>
+      <p:sp>
+        <p:nvSpPr>
+          <p:cNvPr id="5" name="Rettangolo con angoli arrotondati 4">
+            <a:extLst>
+              <a:ext uri="{FF2B5EF4-FFF2-40B4-BE49-F238E27FC236}">
+                <a16:creationId xmlns:a16="http://schemas.microsoft.com/office/drawing/2014/main" id="{3160EB98-A43C-2A4F-993C-69976B419DC5}"/>
+              </a:ext>
+            </a:extLst>
+          </p:cNvPr>
+          <p:cNvSpPr/>
+          <p:nvPr/>
+        </p:nvSpPr>
+        <p:spPr>
+          <a:xfrm>
+            <a:off x="8712437" y="3632677"/>
+            <a:ext cx="3117272" cy="1915536"/>
+          </a:xfrm>
+          <a:prstGeom prst="roundRect">
+            <a:avLst/>
+          </a:prstGeom>
+        </p:spPr>
+        <p:style>
+          <a:lnRef idx="1">
+            <a:schemeClr val="accent4"/>
+          </a:lnRef>
+          <a:fillRef idx="2">
+            <a:schemeClr val="accent4"/>
+          </a:fillRef>
+          <a:effectRef idx="1">
+            <a:schemeClr val="accent4"/>
+          </a:effectRef>
+          <a:fontRef idx="minor">
+            <a:schemeClr val="dk1"/>
+          </a:fontRef>
+        </p:style>
+        <p:txBody>
+          <a:bodyPr rtlCol="0" anchor="ctr"/>
+          <a:lstStyle/>
+          <a:p>
+            <a:pPr algn="ctr"/>
+            <a:r>
+              <a:rPr lang="en-GB" dirty="0"/>
+              <a:t>TECHNICAL</a:t>
+            </a:r>
+          </a:p>
+          <a:p>
+            <a:pPr algn="ctr"/>
+            <a:r>
+              <a:rPr lang="en-GB" dirty="0"/>
+              <a:t>SPECIFICATIONS</a:t>
+            </a:r>
+          </a:p>
+        </p:txBody>
+      </p:sp>
+      <p:sp>
+        <p:nvSpPr>
+          <p:cNvPr id="6" name="CasellaDiTesto 5">
+            <a:extLst>
+              <a:ext uri="{FF2B5EF4-FFF2-40B4-BE49-F238E27FC236}">
+                <a16:creationId xmlns:a16="http://schemas.microsoft.com/office/drawing/2014/main" id="{FE9C696D-0043-B84B-AC05-7DE26514D580}"/>
+              </a:ext>
+            </a:extLst>
+          </p:cNvPr>
+          <p:cNvSpPr txBox="1"/>
+          <p:nvPr/>
+        </p:nvSpPr>
+        <p:spPr>
+          <a:xfrm>
+            <a:off x="2743200" y="1540224"/>
+            <a:ext cx="4946072" cy="369332"/>
+          </a:xfrm>
+          <a:prstGeom prst="rect">
+            <a:avLst/>
+          </a:prstGeom>
+          <a:noFill/>
+        </p:spPr>
+        <p:txBody>
+          <a:bodyPr wrap="square" rtlCol="0">
+            <a:spAutoFit/>
+          </a:bodyPr>
+          <a:lstStyle/>
+          <a:p>
+            <a:r>
+              <a:rPr lang="en-GB" dirty="0"/>
+              <a:t>-- subsample on 10 iterations particle dynamics --</a:t>
+            </a:r>
+          </a:p>
+        </p:txBody>
+      </p:sp>
+      <p:sp>
+        <p:nvSpPr>
+          <p:cNvPr id="7" name="CasellaDiTesto 6">
+            <a:extLst>
+              <a:ext uri="{FF2B5EF4-FFF2-40B4-BE49-F238E27FC236}">
+                <a16:creationId xmlns:a16="http://schemas.microsoft.com/office/drawing/2014/main" id="{F8C2BB30-CC11-0147-A0DC-3312D03B27F4}"/>
+              </a:ext>
+            </a:extLst>
+          </p:cNvPr>
+          <p:cNvSpPr txBox="1"/>
+          <p:nvPr/>
+        </p:nvSpPr>
+        <p:spPr>
+          <a:xfrm>
+            <a:off x="374071" y="2982967"/>
+            <a:ext cx="7315201" cy="3647152"/>
+          </a:xfrm>
+          <a:prstGeom prst="rect">
+            <a:avLst/>
+          </a:prstGeom>
+          <a:noFill/>
+        </p:spPr>
+        <p:txBody>
+          <a:bodyPr wrap="square" rtlCol="0">
+            <a:spAutoFit/>
+          </a:bodyPr>
+          <a:lstStyle/>
+          <a:p>
+            <a:r>
+              <a:rPr lang="en-GB" sz="1100" dirty="0"/>
+              <a:t> %   cumulative   self              self     total           </a:t>
+            </a:r>
+          </a:p>
+          <a:p>
+            <a:r>
+              <a:rPr lang="en-GB" sz="1100" dirty="0"/>
+              <a:t> time   seconds   seconds    calls   s/call   s/call  name    </a:t>
+            </a:r>
+          </a:p>
+          <a:p>
+            <a:r>
+              <a:rPr lang="en-GB" sz="1100" dirty="0"/>
+              <a:t> 49.80     42.39    </a:t>
+            </a:r>
+            <a:r>
+              <a:rPr lang="en-GB" sz="1100" dirty="0">
+                <a:highlight>
+                  <a:srgbClr val="FFFF00"/>
+                </a:highlight>
+              </a:rPr>
+              <a:t>42.39</a:t>
+            </a:r>
+            <a:r>
+              <a:rPr lang="en-GB" sz="1100" dirty="0"/>
+              <a:t>        1    42.39    84.08  </a:t>
+            </a:r>
+            <a:r>
+              <a:rPr lang="en-GB" sz="1100" dirty="0" err="1">
+                <a:highlight>
+                  <a:srgbClr val="FFFF00"/>
+                </a:highlight>
+              </a:rPr>
+              <a:t>SystemEvolution</a:t>
+            </a:r>
+            <a:endParaRPr lang="en-GB" sz="1100" dirty="0">
+              <a:highlight>
+                <a:srgbClr val="FFFF00"/>
+              </a:highlight>
+            </a:endParaRPr>
+          </a:p>
+          <a:p>
+            <a:r>
+              <a:rPr lang="en-GB" sz="1100" dirty="0"/>
+              <a:t> 34.56     71.81    </a:t>
+            </a:r>
+            <a:r>
+              <a:rPr lang="en-GB" sz="1100" dirty="0">
+                <a:highlight>
+                  <a:srgbClr val="FFFF00"/>
+                </a:highlight>
+              </a:rPr>
+              <a:t>29.42</a:t>
+            </a:r>
+            <a:r>
+              <a:rPr lang="en-GB" sz="1100" dirty="0"/>
+              <a:t> 263898224     0.00     0.00  </a:t>
+            </a:r>
+            <a:r>
+              <a:rPr lang="en-GB" sz="1100" dirty="0" err="1">
+                <a:highlight>
+                  <a:srgbClr val="FFFF00"/>
+                </a:highlight>
+              </a:rPr>
+              <a:t>ForceCompt</a:t>
+            </a:r>
+            <a:endParaRPr lang="en-GB" sz="1100" dirty="0">
+              <a:highlight>
+                <a:srgbClr val="FFFF00"/>
+              </a:highlight>
+            </a:endParaRPr>
+          </a:p>
+          <a:p>
+            <a:r>
+              <a:rPr lang="en-GB" sz="1100" dirty="0"/>
+              <a:t> 13.89     83.63    </a:t>
+            </a:r>
+            <a:r>
+              <a:rPr lang="en-GB" sz="1100" dirty="0">
+                <a:highlight>
+                  <a:srgbClr val="FFFF00"/>
+                </a:highlight>
+              </a:rPr>
+              <a:t>11.82</a:t>
+            </a:r>
+            <a:r>
+              <a:rPr lang="en-GB" sz="1100" dirty="0"/>
+              <a:t> 264111744     0.00     0.00  </a:t>
+            </a:r>
+            <a:r>
+              <a:rPr lang="en-GB" sz="1100" dirty="0" err="1">
+                <a:highlight>
+                  <a:srgbClr val="FFFF00"/>
+                </a:highlight>
+              </a:rPr>
+              <a:t>newparticle</a:t>
+            </a:r>
+            <a:endParaRPr lang="en-GB" sz="1100" dirty="0">
+              <a:highlight>
+                <a:srgbClr val="FFFF00"/>
+              </a:highlight>
+            </a:endParaRPr>
+          </a:p>
+          <a:p>
+            <a:r>
+              <a:rPr lang="en-GB" sz="1100" dirty="0"/>
+              <a:t>  1.23     84.68     1.05        1     1.05     1.05  </a:t>
+            </a:r>
+            <a:r>
+              <a:rPr lang="en-GB" sz="1100" dirty="0" err="1"/>
+              <a:t>GeneratingField</a:t>
+            </a:r>
+            <a:endParaRPr lang="en-GB" sz="1100" dirty="0"/>
+          </a:p>
+          <a:p>
+            <a:r>
+              <a:rPr lang="en-GB" sz="1100" dirty="0"/>
+              <a:t>  0.31     84.94     0.26       10     0.03     0.03  IntVal2ppm</a:t>
+            </a:r>
+          </a:p>
+          <a:p>
+            <a:r>
+              <a:rPr lang="en-GB" sz="1100" dirty="0"/>
+              <a:t>  0.08     85.01     0.07       10     0.01     0.01  </a:t>
+            </a:r>
+            <a:r>
+              <a:rPr lang="en-GB" sz="1100" dirty="0" err="1"/>
+              <a:t>ParticleStats</a:t>
+            </a:r>
+            <a:endParaRPr lang="en-GB" sz="1100" dirty="0"/>
+          </a:p>
+          <a:p>
+            <a:r>
+              <a:rPr lang="en-GB" sz="1100" dirty="0"/>
+              <a:t>  0.06     85.06     0.05       11     0.00     0.00  </a:t>
+            </a:r>
+            <a:r>
+              <a:rPr lang="en-GB" sz="1100" dirty="0" err="1"/>
+              <a:t>MinIntVal</a:t>
+            </a:r>
+            <a:endParaRPr lang="en-GB" sz="1100" dirty="0"/>
+          </a:p>
+          <a:p>
+            <a:r>
+              <a:rPr lang="en-GB" sz="1100" dirty="0"/>
+              <a:t>  0.06     85.11     0.05       10     0.01     0.04  </a:t>
+            </a:r>
+            <a:r>
+              <a:rPr lang="en-GB" sz="1100" dirty="0" err="1"/>
+              <a:t>ParticleScreen</a:t>
+            </a:r>
+            <a:endParaRPr lang="en-GB" sz="1100" dirty="0"/>
+          </a:p>
+          <a:p>
+            <a:r>
+              <a:rPr lang="en-GB" sz="1100" dirty="0"/>
+              <a:t>  0.06     85.16     0.05        1     0.05     0.06  </a:t>
+            </a:r>
+            <a:r>
+              <a:rPr lang="en-GB" sz="1100" dirty="0" err="1"/>
+              <a:t>ParticleGeneration</a:t>
+            </a:r>
+            <a:endParaRPr lang="en-GB" sz="1100" dirty="0"/>
+          </a:p>
+          <a:p>
+            <a:r>
+              <a:rPr lang="en-GB" sz="1100" dirty="0"/>
+              <a:t>  0.02     85.18     0.02       11     0.00     0.00  </a:t>
+            </a:r>
+            <a:r>
+              <a:rPr lang="en-GB" sz="1100" dirty="0" err="1"/>
+              <a:t>MaxIntVal</a:t>
+            </a:r>
+            <a:endParaRPr lang="en-GB" sz="1100" dirty="0"/>
+          </a:p>
+          <a:p>
+            <a:r>
+              <a:rPr lang="en-GB" sz="1100" dirty="0"/>
+              <a:t>  0.00     85.18     0.00       27     0.00     0.00  </a:t>
+            </a:r>
+            <a:r>
+              <a:rPr lang="en-GB" sz="1100" dirty="0" err="1"/>
+              <a:t>rowlen</a:t>
+            </a:r>
+            <a:endParaRPr lang="en-GB" sz="1100" dirty="0"/>
+          </a:p>
+          <a:p>
+            <a:r>
+              <a:rPr lang="en-GB" sz="1100" dirty="0"/>
+              <a:t>  0.00     85.18     0.00       24     0.00     0.00  </a:t>
+            </a:r>
+            <a:r>
+              <a:rPr lang="en-GB" sz="1100" dirty="0" err="1"/>
+              <a:t>readrow</a:t>
+            </a:r>
+            <a:endParaRPr lang="en-GB" sz="1100" dirty="0"/>
+          </a:p>
+          <a:p>
+            <a:r>
+              <a:rPr lang="en-GB" sz="1100" dirty="0"/>
+              <a:t>  0.00     85.18     0.00       10     0.00     0.00  </a:t>
+            </a:r>
+            <a:r>
+              <a:rPr lang="en-GB" sz="1100" dirty="0" err="1"/>
+              <a:t>ComptPopulation</a:t>
+            </a:r>
+            <a:endParaRPr lang="en-GB" sz="1100" dirty="0"/>
+          </a:p>
+          <a:p>
+            <a:r>
+              <a:rPr lang="en-GB" sz="1100" dirty="0"/>
+              <a:t>  0.00     85.18     0.00       10     0.00     0.00  </a:t>
+            </a:r>
+            <a:r>
+              <a:rPr lang="en-GB" sz="1100" dirty="0" err="1"/>
+              <a:t>MaxDoubleVal</a:t>
+            </a:r>
+            <a:endParaRPr lang="en-GB" sz="1100" dirty="0"/>
+          </a:p>
+          <a:p>
+            <a:r>
+              <a:rPr lang="en-GB" sz="1100" dirty="0"/>
+              <a:t>  0.00     85.18     0.00       10     0.00     0.00  </a:t>
+            </a:r>
+            <a:r>
+              <a:rPr lang="en-GB" sz="1100" dirty="0" err="1"/>
+              <a:t>MinDoubleVal</a:t>
+            </a:r>
+            <a:endParaRPr lang="en-GB" sz="1100" dirty="0"/>
+          </a:p>
+          <a:p>
+            <a:r>
+              <a:rPr lang="en-GB" sz="1100" dirty="0"/>
+              <a:t>  0.00     85.18     0.00        3     0.00     0.00  </a:t>
+            </a:r>
+            <a:r>
+              <a:rPr lang="en-GB" sz="1100" dirty="0" err="1"/>
+              <a:t>DumpPopulation</a:t>
+            </a:r>
+            <a:endParaRPr lang="en-GB" sz="1100" dirty="0"/>
+          </a:p>
+          <a:p>
+            <a:r>
+              <a:rPr lang="en-GB" sz="1100" dirty="0"/>
+              <a:t>  0.00     85.18     0.00        2     0.00     0.00  print_i2dGrid</a:t>
+            </a:r>
+          </a:p>
+          <a:p>
+            <a:r>
+              <a:rPr lang="en-GB" sz="1100" dirty="0"/>
+              <a:t>  0.00     85.18     0.00        1     0.00     0.00  </a:t>
+            </a:r>
+            <a:r>
+              <a:rPr lang="en-GB" sz="1100" dirty="0" err="1"/>
+              <a:t>InitGrid</a:t>
+            </a:r>
+            <a:endParaRPr lang="en-GB" sz="1100" dirty="0"/>
+          </a:p>
+          <a:p>
+            <a:r>
+              <a:rPr lang="en-GB" sz="1100" dirty="0"/>
+              <a:t>  0.00     85.18     0.00        1     0.00     0.00  </a:t>
+            </a:r>
+            <a:r>
+              <a:rPr lang="en-GB" sz="1100" dirty="0" err="1"/>
+              <a:t>print_Population</a:t>
+            </a:r>
+            <a:endParaRPr lang="en-GB" sz="1100" dirty="0"/>
+          </a:p>
+        </p:txBody>
+      </p:sp>
+      <p:sp>
+        <p:nvSpPr>
+          <p:cNvPr id="8" name="Segnaposto contenuto 2">
+            <a:extLst>
+              <a:ext uri="{FF2B5EF4-FFF2-40B4-BE49-F238E27FC236}">
+                <a16:creationId xmlns:a16="http://schemas.microsoft.com/office/drawing/2014/main" id="{79E87BCA-5077-BC41-B42E-29374A77F4DD}"/>
+              </a:ext>
+            </a:extLst>
+          </p:cNvPr>
+          <p:cNvSpPr txBox="1">
+            <a:spLocks/>
+          </p:cNvSpPr>
+          <p:nvPr/>
+        </p:nvSpPr>
+        <p:spPr>
+          <a:xfrm>
+            <a:off x="7689272" y="2269859"/>
+            <a:ext cx="3425184" cy="369332"/>
+          </a:xfrm>
+          <a:prstGeom prst="rect">
+            <a:avLst/>
+          </a:prstGeom>
+          <a:ln w="28575">
+            <a:solidFill>
+              <a:schemeClr val="tx1"/>
+            </a:solidFill>
+          </a:ln>
+        </p:spPr>
+        <p:txBody>
+          <a:bodyPr vert="horz" lIns="91440" tIns="45720" rIns="91440" bIns="45720" rtlCol="0" anchor="ctr" anchorCtr="0">
+            <a:spAutoFit/>
+          </a:bodyPr>
+          <a:lstStyle>
+            <a:lvl1pPr marL="228600" indent="-228600" algn="l" defTabSz="914400" rtl="0" eaLnBrk="1" latinLnBrk="0" hangingPunct="1">
+              <a:lnSpc>
+                <a:spcPct val="90000"/>
+              </a:lnSpc>
+              <a:spcBef>
+                <a:spcPts val="1000"/>
+              </a:spcBef>
+              <a:buFont typeface="Arial" panose="020B0604020202020204" pitchFamily="34" charset="0"/>
+              <a:buChar char="•"/>
+              <a:defRPr sz="2800" kern="1200">
+                <a:solidFill>
+                  <a:schemeClr val="tx1"/>
+                </a:solidFill>
+                <a:latin typeface="+mn-lt"/>
+                <a:ea typeface="+mn-ea"/>
+                <a:cs typeface="+mn-cs"/>
+              </a:defRPr>
+            </a:lvl1pPr>
+            <a:lvl2pPr marL="685800" indent="-228600" algn="l" defTabSz="914400" rtl="0" eaLnBrk="1" latinLnBrk="0" hangingPunct="1">
+              <a:lnSpc>
+                <a:spcPct val="90000"/>
+              </a:lnSpc>
+              <a:spcBef>
+                <a:spcPts val="500"/>
+              </a:spcBef>
+              <a:buFont typeface="Arial" panose="020B0604020202020204" pitchFamily="34" charset="0"/>
+              <a:buChar char="•"/>
+              <a:defRPr sz="2400" kern="1200">
+                <a:solidFill>
+                  <a:schemeClr val="tx1"/>
+                </a:solidFill>
+                <a:latin typeface="+mn-lt"/>
+                <a:ea typeface="+mn-ea"/>
+                <a:cs typeface="+mn-cs"/>
+              </a:defRPr>
+            </a:lvl2pPr>
+            <a:lvl3pPr marL="1143000" indent="-228600" algn="l" defTabSz="914400" rtl="0" eaLnBrk="1" latinLnBrk="0" hangingPunct="1">
+              <a:lnSpc>
+                <a:spcPct val="90000"/>
+              </a:lnSpc>
+              <a:spcBef>
+                <a:spcPts val="500"/>
+              </a:spcBef>
+              <a:buFont typeface="Arial" panose="020B0604020202020204" pitchFamily="34" charset="0"/>
+              <a:buChar char="•"/>
+              <a:defRPr sz="2000" kern="1200">
+                <a:solidFill>
+                  <a:schemeClr val="tx1"/>
+                </a:solidFill>
+                <a:latin typeface="+mn-lt"/>
+                <a:ea typeface="+mn-ea"/>
+                <a:cs typeface="+mn-cs"/>
+              </a:defRPr>
+            </a:lvl3pPr>
+            <a:lvl4pPr marL="1600200" indent="-228600" algn="l" defTabSz="914400" rtl="0" eaLnBrk="1" latinLnBrk="0" hangingPunct="1">
+              <a:lnSpc>
+                <a:spcPct val="90000"/>
+              </a:lnSpc>
+              <a:spcBef>
+                <a:spcPts val="500"/>
+              </a:spcBef>
+              <a:buFont typeface="Arial" panose="020B0604020202020204" pitchFamily="34" charset="0"/>
+              <a:buChar char="•"/>
+              <a:defRPr sz="1800" kern="1200">
+                <a:solidFill>
+                  <a:schemeClr val="tx1"/>
+                </a:solidFill>
+                <a:latin typeface="+mn-lt"/>
+                <a:ea typeface="+mn-ea"/>
+                <a:cs typeface="+mn-cs"/>
+              </a:defRPr>
+            </a:lvl4pPr>
+            <a:lvl5pPr marL="2057400" indent="-228600" algn="l" defTabSz="914400" rtl="0" eaLnBrk="1" latinLnBrk="0" hangingPunct="1">
+              <a:lnSpc>
+                <a:spcPct val="90000"/>
+              </a:lnSpc>
+              <a:spcBef>
+                <a:spcPts val="500"/>
+              </a:spcBef>
+              <a:buFont typeface="Arial" panose="020B0604020202020204" pitchFamily="34" charset="0"/>
+              <a:buChar char="•"/>
+              <a:defRPr sz="1800" kern="1200">
+                <a:solidFill>
+                  <a:schemeClr val="tx1"/>
+                </a:solidFill>
+                <a:latin typeface="+mn-lt"/>
+                <a:ea typeface="+mn-ea"/>
+                <a:cs typeface="+mn-cs"/>
+              </a:defRPr>
+            </a:lvl5pPr>
+            <a:lvl6pPr marL="2514600" indent="-228600" algn="l" defTabSz="914400" rtl="0" eaLnBrk="1" latinLnBrk="0" hangingPunct="1">
+              <a:lnSpc>
+                <a:spcPct val="90000"/>
+              </a:lnSpc>
+              <a:spcBef>
+                <a:spcPts val="500"/>
+              </a:spcBef>
+              <a:buFont typeface="Arial" panose="020B0604020202020204" pitchFamily="34" charset="0"/>
+              <a:buChar char="•"/>
+              <a:defRPr sz="1800" kern="1200">
+                <a:solidFill>
+                  <a:schemeClr val="tx1"/>
+                </a:solidFill>
+                <a:latin typeface="+mn-lt"/>
+                <a:ea typeface="+mn-ea"/>
+                <a:cs typeface="+mn-cs"/>
+              </a:defRPr>
+            </a:lvl6pPr>
+            <a:lvl7pPr marL="2971800" indent="-228600" algn="l" defTabSz="914400" rtl="0" eaLnBrk="1" latinLnBrk="0" hangingPunct="1">
+              <a:lnSpc>
+                <a:spcPct val="90000"/>
+              </a:lnSpc>
+              <a:spcBef>
+                <a:spcPts val="500"/>
+              </a:spcBef>
+              <a:buFont typeface="Arial" panose="020B0604020202020204" pitchFamily="34" charset="0"/>
+              <a:buChar char="•"/>
+              <a:defRPr sz="1800" kern="1200">
+                <a:solidFill>
+                  <a:schemeClr val="tx1"/>
+                </a:solidFill>
+                <a:latin typeface="+mn-lt"/>
+                <a:ea typeface="+mn-ea"/>
+                <a:cs typeface="+mn-cs"/>
+              </a:defRPr>
+            </a:lvl7pPr>
+            <a:lvl8pPr marL="3429000" indent="-228600" algn="l" defTabSz="914400" rtl="0" eaLnBrk="1" latinLnBrk="0" hangingPunct="1">
+              <a:lnSpc>
+                <a:spcPct val="90000"/>
+              </a:lnSpc>
+              <a:spcBef>
+                <a:spcPts val="500"/>
+              </a:spcBef>
+              <a:buFont typeface="Arial" panose="020B0604020202020204" pitchFamily="34" charset="0"/>
+              <a:buChar char="•"/>
+              <a:defRPr sz="1800" kern="1200">
+                <a:solidFill>
+                  <a:schemeClr val="tx1"/>
+                </a:solidFill>
+                <a:latin typeface="+mn-lt"/>
+                <a:ea typeface="+mn-ea"/>
+                <a:cs typeface="+mn-cs"/>
+              </a:defRPr>
+            </a:lvl8pPr>
+            <a:lvl9pPr marL="3886200" indent="-228600" algn="l" defTabSz="914400" rtl="0" eaLnBrk="1" latinLnBrk="0" hangingPunct="1">
+              <a:lnSpc>
+                <a:spcPct val="90000"/>
+              </a:lnSpc>
+              <a:spcBef>
+                <a:spcPts val="500"/>
+              </a:spcBef>
+              <a:buFont typeface="Arial" panose="020B0604020202020204" pitchFamily="34" charset="0"/>
+              <a:buChar char="•"/>
+              <a:defRPr sz="1800" kern="1200">
+                <a:solidFill>
+                  <a:schemeClr val="tx1"/>
+                </a:solidFill>
+                <a:latin typeface="+mn-lt"/>
+                <a:ea typeface="+mn-ea"/>
+                <a:cs typeface="+mn-cs"/>
+              </a:defRPr>
+            </a:lvl9pPr>
+          </a:lstStyle>
+          <a:p>
+            <a:pPr marL="0" indent="0" algn="ctr">
+              <a:buNone/>
+            </a:pPr>
+            <a:r>
+              <a:rPr lang="en-US" sz="2000" i="1" dirty="0"/>
+              <a:t>Total time 3m29,220s</a:t>
+            </a:r>
+          </a:p>
+        </p:txBody>
+      </p:sp>
+      <p:sp>
+        <p:nvSpPr>
+          <p:cNvPr id="9" name="CasellaDiTesto 8">
+            <a:extLst>
+              <a:ext uri="{FF2B5EF4-FFF2-40B4-BE49-F238E27FC236}">
+                <a16:creationId xmlns:a16="http://schemas.microsoft.com/office/drawing/2014/main" id="{C943BC3A-22EE-F444-9F44-CD9D0D27B4DE}"/>
+              </a:ext>
+            </a:extLst>
+          </p:cNvPr>
+          <p:cNvSpPr txBox="1"/>
+          <p:nvPr/>
+        </p:nvSpPr>
+        <p:spPr>
+          <a:xfrm>
+            <a:off x="5467686" y="3156306"/>
+            <a:ext cx="2871611" cy="923330"/>
+          </a:xfrm>
+          <a:prstGeom prst="rect">
+            <a:avLst/>
+          </a:prstGeom>
+          <a:noFill/>
+        </p:spPr>
+        <p:txBody>
+          <a:bodyPr wrap="square" rtlCol="0">
+            <a:spAutoFit/>
+          </a:bodyPr>
+          <a:lstStyle/>
+          <a:p>
+            <a:r>
+              <a:rPr lang="en-GB" dirty="0"/>
+              <a:t>Once summed up, these alone represent</a:t>
+            </a:r>
+          </a:p>
+          <a:p>
+            <a:r>
+              <a:rPr lang="en-GB" dirty="0">
+                <a:highlight>
+                  <a:srgbClr val="FFFF00"/>
+                </a:highlight>
+              </a:rPr>
+              <a:t>98,25% of CPU time</a:t>
+            </a:r>
+          </a:p>
+        </p:txBody>
+      </p:sp>
+      <p:cxnSp>
+        <p:nvCxnSpPr>
+          <p:cNvPr id="11" name="Connettore 2 10">
+            <a:extLst>
+              <a:ext uri="{FF2B5EF4-FFF2-40B4-BE49-F238E27FC236}">
+                <a16:creationId xmlns:a16="http://schemas.microsoft.com/office/drawing/2014/main" id="{96CCDB60-A8BD-454D-A220-EBFA55BD7693}"/>
+              </a:ext>
+            </a:extLst>
+          </p:cNvPr>
+          <p:cNvCxnSpPr>
+            <a:cxnSpLocks/>
+          </p:cNvCxnSpPr>
+          <p:nvPr/>
+        </p:nvCxnSpPr>
+        <p:spPr>
+          <a:xfrm flipH="1" flipV="1">
+            <a:off x="4065794" y="3429001"/>
+            <a:ext cx="1401892" cy="212781"/>
+          </a:xfrm>
+          <a:prstGeom prst="straightConnector1">
+            <a:avLst/>
+          </a:prstGeom>
+          <a:ln>
+            <a:tailEnd type="triangle"/>
+          </a:ln>
+        </p:spPr>
+        <p:style>
+          <a:lnRef idx="1">
+            <a:schemeClr val="dk1"/>
+          </a:lnRef>
+          <a:fillRef idx="0">
+            <a:schemeClr val="dk1"/>
+          </a:fillRef>
+          <a:effectRef idx="0">
+            <a:schemeClr val="dk1"/>
+          </a:effectRef>
+          <a:fontRef idx="minor">
+            <a:schemeClr val="tx1"/>
+          </a:fontRef>
+        </p:style>
+      </p:cxnSp>
+      <p:cxnSp>
+        <p:nvCxnSpPr>
+          <p:cNvPr id="13" name="Connettore 2 12">
+            <a:extLst>
+              <a:ext uri="{FF2B5EF4-FFF2-40B4-BE49-F238E27FC236}">
+                <a16:creationId xmlns:a16="http://schemas.microsoft.com/office/drawing/2014/main" id="{DEE8F3A0-9ABC-5B41-B163-86320BBA82B0}"/>
+              </a:ext>
+            </a:extLst>
+          </p:cNvPr>
+          <p:cNvCxnSpPr>
+            <a:cxnSpLocks/>
+          </p:cNvCxnSpPr>
+          <p:nvPr/>
+        </p:nvCxnSpPr>
+        <p:spPr>
+          <a:xfrm flipH="1" flipV="1">
+            <a:off x="4065794" y="3624438"/>
+            <a:ext cx="1401892" cy="116273"/>
+          </a:xfrm>
+          <a:prstGeom prst="straightConnector1">
+            <a:avLst/>
+          </a:prstGeom>
+          <a:ln>
+            <a:tailEnd type="triangle"/>
+          </a:ln>
+        </p:spPr>
+        <p:style>
+          <a:lnRef idx="1">
+            <a:schemeClr val="dk1"/>
+          </a:lnRef>
+          <a:fillRef idx="0">
+            <a:schemeClr val="dk1"/>
+          </a:fillRef>
+          <a:effectRef idx="0">
+            <a:schemeClr val="dk1"/>
+          </a:effectRef>
+          <a:fontRef idx="minor">
+            <a:schemeClr val="tx1"/>
+          </a:fontRef>
+        </p:style>
+      </p:cxnSp>
+      <p:cxnSp>
+        <p:nvCxnSpPr>
+          <p:cNvPr id="16" name="Connettore 2 15">
+            <a:extLst>
+              <a:ext uri="{FF2B5EF4-FFF2-40B4-BE49-F238E27FC236}">
+                <a16:creationId xmlns:a16="http://schemas.microsoft.com/office/drawing/2014/main" id="{E0B4D4AD-CF4F-1843-839D-CE9E3E6F6660}"/>
+              </a:ext>
+            </a:extLst>
+          </p:cNvPr>
+          <p:cNvCxnSpPr>
+            <a:cxnSpLocks/>
+          </p:cNvCxnSpPr>
+          <p:nvPr/>
+        </p:nvCxnSpPr>
+        <p:spPr>
+          <a:xfrm flipH="1">
+            <a:off x="4065794" y="3800957"/>
+            <a:ext cx="1401892" cy="4295"/>
+          </a:xfrm>
+          <a:prstGeom prst="straightConnector1">
+            <a:avLst/>
+          </a:prstGeom>
+          <a:ln>
+            <a:tailEnd type="triangle"/>
+          </a:ln>
+        </p:spPr>
+        <p:style>
+          <a:lnRef idx="1">
+            <a:schemeClr val="dk1"/>
+          </a:lnRef>
+          <a:fillRef idx="0">
+            <a:schemeClr val="dk1"/>
+          </a:fillRef>
+          <a:effectRef idx="0">
+            <a:schemeClr val="dk1"/>
+          </a:effectRef>
+          <a:fontRef idx="minor">
+            <a:schemeClr val="tx1"/>
+          </a:fontRef>
+        </p:style>
+      </p:cxnSp>
+      <p:sp>
+        <p:nvSpPr>
+          <p:cNvPr id="31" name="CasellaDiTesto 30">
+            <a:extLst>
+              <a:ext uri="{FF2B5EF4-FFF2-40B4-BE49-F238E27FC236}">
+                <a16:creationId xmlns:a16="http://schemas.microsoft.com/office/drawing/2014/main" id="{C1DCA7B7-73F0-6845-BA94-E3462CF7CD62}"/>
+              </a:ext>
+            </a:extLst>
+          </p:cNvPr>
+          <p:cNvSpPr txBox="1"/>
+          <p:nvPr/>
+        </p:nvSpPr>
+        <p:spPr>
+          <a:xfrm>
+            <a:off x="4476465" y="6373876"/>
+            <a:ext cx="7353243" cy="369332"/>
+          </a:xfrm>
+          <a:prstGeom prst="rect">
+            <a:avLst/>
+          </a:prstGeom>
+          <a:noFill/>
+        </p:spPr>
+        <p:txBody>
+          <a:bodyPr wrap="square" rtlCol="0">
+            <a:spAutoFit/>
+          </a:bodyPr>
+          <a:lstStyle/>
+          <a:p>
+            <a:r>
+              <a:rPr lang="en-GB" u="sng" dirty="0" err="1"/>
+              <a:t>gprof</a:t>
+            </a:r>
+            <a:r>
+              <a:rPr lang="en-GB" u="sng" dirty="0"/>
+              <a:t> doesn’t account for time spent in I/O ( ~ 60% of total time) </a:t>
+            </a:r>
+          </a:p>
+        </p:txBody>
+      </p:sp>
+      <p:cxnSp>
+        <p:nvCxnSpPr>
+          <p:cNvPr id="34" name="Connettore 4 33">
+            <a:extLst>
+              <a:ext uri="{FF2B5EF4-FFF2-40B4-BE49-F238E27FC236}">
+                <a16:creationId xmlns:a16="http://schemas.microsoft.com/office/drawing/2014/main" id="{B6301265-C865-1E41-A56C-042DE4781CEC}"/>
+              </a:ext>
+            </a:extLst>
+          </p:cNvPr>
+          <p:cNvCxnSpPr>
+            <a:cxnSpLocks/>
+          </p:cNvCxnSpPr>
+          <p:nvPr/>
+        </p:nvCxnSpPr>
+        <p:spPr>
+          <a:xfrm>
+            <a:off x="1037230" y="6558542"/>
+            <a:ext cx="3248167" cy="131823"/>
+          </a:xfrm>
+          <a:prstGeom prst="bentConnector3">
+            <a:avLst>
+              <a:gd name="adj1" fmla="val 0"/>
+            </a:avLst>
+          </a:prstGeom>
+          <a:ln>
+            <a:headEnd type="triangle"/>
+            <a:tailEnd type="none"/>
+          </a:ln>
+        </p:spPr>
+        <p:style>
+          <a:lnRef idx="1">
+            <a:schemeClr val="dk1"/>
+          </a:lnRef>
+          <a:fillRef idx="0">
+            <a:schemeClr val="dk1"/>
+          </a:fillRef>
+          <a:effectRef idx="0">
+            <a:schemeClr val="dk1"/>
+          </a:effectRef>
+          <a:fontRef idx="minor">
+            <a:schemeClr val="tx1"/>
+          </a:fontRef>
+        </p:style>
+      </p:cxnSp>
     </p:spTree>
     <p:extLst>
       <p:ext uri="{BB962C8B-B14F-4D97-AF65-F5344CB8AC3E}">
-        <p14:creationId xmlns:p14="http://schemas.microsoft.com/office/powerpoint/2010/main" val="3388683139"/>
+        <p14:creationId xmlns:p14="http://schemas.microsoft.com/office/powerpoint/2010/main" val="3472327148"/>
       </p:ext>
     </p:extLst>
   </p:cSld>

</xml_diff>